<commit_message>
Presentation's title page changed
</commit_message>
<xml_diff>
--- a/TddSample/TDD.pptx
+++ b/TddSample/TDD.pptx
@@ -3863,11 +3863,7 @@
           <a:p>
             <a:r>
               <a:rPr lang="pl-PL" smtClean="0"/>
-              <a:t>Testowanie </a:t>
-            </a:r>
-            <a:r>
-              <a:rPr lang="pl-PL" smtClean="0"/>
-              <a:t>jednostkowe</a:t>
+              <a:t>Testowanie jednostkowe</a:t>
             </a:r>
             <a:r>
               <a:rPr lang="pl-PL" dirty="0" smtClean="0"/>
@@ -3894,15 +3890,41 @@
             <p:ph type="subTitle" idx="1"/>
           </p:nvPr>
         </p:nvSpPr>
-        <p:spPr/>
+        <p:spPr>
+          <a:xfrm>
+            <a:off x="1259632" y="3886200"/>
+            <a:ext cx="6696744" cy="1752600"/>
+          </a:xfrm>
+        </p:spPr>
         <p:txBody>
           <a:bodyPr/>
           <a:lstStyle/>
           <a:p>
             <a:r>
               <a:rPr lang="pl-PL" dirty="0" smtClean="0"/>
-              <a:t>Robert Pająk</a:t>
-            </a:r>
+              <a:t>Robert </a:t>
+            </a:r>
+            <a:r>
+              <a:rPr lang="pl-PL" dirty="0" smtClean="0"/>
+              <a:t>Pająk</a:t>
+            </a:r>
+          </a:p>
+          <a:p>
+            <a:r>
+              <a:rPr lang="pl-PL" dirty="0">
+                <a:hlinkClick r:id="rId2"/>
+              </a:rPr>
+              <a:t>https://</a:t>
+            </a:r>
+            <a:r>
+              <a:rPr lang="pl-PL" dirty="0" smtClean="0">
+                <a:hlinkClick r:id="rId2"/>
+              </a:rPr>
+              <a:t>github.com/Pellared/Examples</a:t>
+            </a:r>
+            <a:endParaRPr lang="pl-PL" dirty="0" smtClean="0"/>
+          </a:p>
+          <a:p>
             <a:endParaRPr lang="pl-PL" dirty="0"/>
           </a:p>
         </p:txBody>

</xml_diff>